<commit_message>
Presentations for Feb. 24 Meeting
- Updated Project doc
- Added to Bluetooth slide
- Edited and added to “sEMG Signal Analysis” slide
- Added new project schedule
</commit_message>
<xml_diff>
--- a/Capstone/presentations/Bluetooth Low Energy.pptx
+++ b/Capstone/presentations/Bluetooth Low Energy.pptx
@@ -9,7 +9,9 @@
     <p:sldId id="257" r:id="rId3"/>
     <p:sldId id="258" r:id="rId4"/>
     <p:sldId id="259" r:id="rId5"/>
-    <p:sldId id="260" r:id="rId6"/>
+    <p:sldId id="261" r:id="rId6"/>
+    <p:sldId id="262" r:id="rId7"/>
+    <p:sldId id="260" r:id="rId8"/>
   </p:sldIdLst>
   <p:sldSz cx="12192000" cy="6858000"/>
   <p:notesSz cx="6858000" cy="9144000"/>
@@ -242,7 +244,7 @@
           <a:p>
             <a:fld id="{44C2D65B-F6B6-4BBA-8BDE-9B3ABDE8E2C5}" type="datetimeFigureOut">
               <a:rPr lang="en-US" smtClean="0"/>
-              <a:t>2/24/2016</a:t>
+              <a:t>2/24/16</a:t>
             </a:fld>
             <a:endParaRPr lang="en-US"/>
           </a:p>
@@ -412,7 +414,7 @@
           <a:p>
             <a:fld id="{44C2D65B-F6B6-4BBA-8BDE-9B3ABDE8E2C5}" type="datetimeFigureOut">
               <a:rPr lang="en-US" smtClean="0"/>
-              <a:t>2/24/2016</a:t>
+              <a:t>2/24/16</a:t>
             </a:fld>
             <a:endParaRPr lang="en-US"/>
           </a:p>
@@ -592,7 +594,7 @@
           <a:p>
             <a:fld id="{44C2D65B-F6B6-4BBA-8BDE-9B3ABDE8E2C5}" type="datetimeFigureOut">
               <a:rPr lang="en-US" smtClean="0"/>
-              <a:t>2/24/2016</a:t>
+              <a:t>2/24/16</a:t>
             </a:fld>
             <a:endParaRPr lang="en-US"/>
           </a:p>
@@ -762,7 +764,7 @@
           <a:p>
             <a:fld id="{44C2D65B-F6B6-4BBA-8BDE-9B3ABDE8E2C5}" type="datetimeFigureOut">
               <a:rPr lang="en-US" smtClean="0"/>
-              <a:t>2/24/2016</a:t>
+              <a:t>2/24/16</a:t>
             </a:fld>
             <a:endParaRPr lang="en-US"/>
           </a:p>
@@ -1008,7 +1010,7 @@
           <a:p>
             <a:fld id="{44C2D65B-F6B6-4BBA-8BDE-9B3ABDE8E2C5}" type="datetimeFigureOut">
               <a:rPr lang="en-US" smtClean="0"/>
-              <a:t>2/24/2016</a:t>
+              <a:t>2/24/16</a:t>
             </a:fld>
             <a:endParaRPr lang="en-US"/>
           </a:p>
@@ -1240,7 +1242,7 @@
           <a:p>
             <a:fld id="{44C2D65B-F6B6-4BBA-8BDE-9B3ABDE8E2C5}" type="datetimeFigureOut">
               <a:rPr lang="en-US" smtClean="0"/>
-              <a:t>2/24/2016</a:t>
+              <a:t>2/24/16</a:t>
             </a:fld>
             <a:endParaRPr lang="en-US"/>
           </a:p>
@@ -1607,7 +1609,7 @@
           <a:p>
             <a:fld id="{44C2D65B-F6B6-4BBA-8BDE-9B3ABDE8E2C5}" type="datetimeFigureOut">
               <a:rPr lang="en-US" smtClean="0"/>
-              <a:t>2/24/2016</a:t>
+              <a:t>2/24/16</a:t>
             </a:fld>
             <a:endParaRPr lang="en-US"/>
           </a:p>
@@ -1725,7 +1727,7 @@
           <a:p>
             <a:fld id="{44C2D65B-F6B6-4BBA-8BDE-9B3ABDE8E2C5}" type="datetimeFigureOut">
               <a:rPr lang="en-US" smtClean="0"/>
-              <a:t>2/24/2016</a:t>
+              <a:t>2/24/16</a:t>
             </a:fld>
             <a:endParaRPr lang="en-US"/>
           </a:p>
@@ -1820,7 +1822,7 @@
           <a:p>
             <a:fld id="{44C2D65B-F6B6-4BBA-8BDE-9B3ABDE8E2C5}" type="datetimeFigureOut">
               <a:rPr lang="en-US" smtClean="0"/>
-              <a:t>2/24/2016</a:t>
+              <a:t>2/24/16</a:t>
             </a:fld>
             <a:endParaRPr lang="en-US"/>
           </a:p>
@@ -2097,7 +2099,7 @@
           <a:p>
             <a:fld id="{44C2D65B-F6B6-4BBA-8BDE-9B3ABDE8E2C5}" type="datetimeFigureOut">
               <a:rPr lang="en-US" smtClean="0"/>
-              <a:t>2/24/2016</a:t>
+              <a:t>2/24/16</a:t>
             </a:fld>
             <a:endParaRPr lang="en-US"/>
           </a:p>
@@ -2350,7 +2352,7 @@
           <a:p>
             <a:fld id="{44C2D65B-F6B6-4BBA-8BDE-9B3ABDE8E2C5}" type="datetimeFigureOut">
               <a:rPr lang="en-US" smtClean="0"/>
-              <a:t>2/24/2016</a:t>
+              <a:t>2/24/16</a:t>
             </a:fld>
             <a:endParaRPr lang="en-US"/>
           </a:p>
@@ -2563,7 +2565,7 @@
           <a:p>
             <a:fld id="{44C2D65B-F6B6-4BBA-8BDE-9B3ABDE8E2C5}" type="datetimeFigureOut">
               <a:rPr lang="en-US" smtClean="0"/>
-              <a:t>2/24/2016</a:t>
+              <a:t>2/24/16</a:t>
             </a:fld>
             <a:endParaRPr lang="en-US"/>
           </a:p>
@@ -3053,7 +3055,7 @@
   <p:timing>
     <p:tnLst>
       <p:par>
-        <p:cTn id="1" dur="indefinite" restart="never" nodeType="tmRoot"/>
+        <p:cTn xmlns:p14="http://schemas.microsoft.com/office/powerpoint/2010/main" id="1" dur="indefinite" restart="never" nodeType="tmRoot"/>
       </p:par>
     </p:tnLst>
   </p:timing>
@@ -3268,7 +3270,7 @@
   <p:timing>
     <p:tnLst>
       <p:par>
-        <p:cTn id="1" dur="indefinite" restart="never" nodeType="tmRoot"/>
+        <p:cTn xmlns:p14="http://schemas.microsoft.com/office/powerpoint/2010/main" id="1" dur="indefinite" restart="never" nodeType="tmRoot"/>
       </p:par>
     </p:tnLst>
   </p:timing>
@@ -3406,7 +3408,7 @@
   <p:timing>
     <p:tnLst>
       <p:par>
-        <p:cTn id="1" dur="indefinite" restart="never" nodeType="tmRoot"/>
+        <p:cTn xmlns:p14="http://schemas.microsoft.com/office/powerpoint/2010/main" id="1" dur="indefinite" restart="never" nodeType="tmRoot"/>
       </p:par>
     </p:tnLst>
   </p:timing>
@@ -3519,7 +3521,7 @@
   <p:timing>
     <p:tnLst>
       <p:par>
-        <p:cTn id="1" dur="indefinite" restart="never" nodeType="tmRoot"/>
+        <p:cTn xmlns:p14="http://schemas.microsoft.com/office/powerpoint/2010/main" id="1" dur="indefinite" restart="never" nodeType="tmRoot"/>
       </p:par>
     </p:tnLst>
   </p:timing>
@@ -3560,6 +3562,265 @@
           <a:p>
             <a:r>
               <a:rPr lang="en-US" dirty="0" smtClean="0"/>
+              <a:t>Bluetooth on the Edison</a:t>
+            </a:r>
+            <a:endParaRPr lang="en-US" dirty="0"/>
+          </a:p>
+        </p:txBody>
+      </p:sp>
+      <p:sp>
+        <p:nvSpPr>
+          <p:cNvPr id="3" name="Content Placeholder 2"/>
+          <p:cNvSpPr>
+            <a:spLocks noGrp="1"/>
+          </p:cNvSpPr>
+          <p:nvPr>
+            <p:ph idx="1"/>
+          </p:nvPr>
+        </p:nvSpPr>
+        <p:spPr/>
+        <p:txBody>
+          <a:bodyPr/>
+          <a:lstStyle/>
+          <a:p>
+            <a:r>
+              <a:rPr lang="en-US" dirty="0" smtClean="0"/>
+              <a:t>Uses </a:t>
+            </a:r>
+            <a:r>
+              <a:rPr lang="en-US" dirty="0" err="1" smtClean="0"/>
+              <a:t>BlueZ</a:t>
+            </a:r>
+            <a:r>
+              <a:rPr lang="en-US" dirty="0" smtClean="0"/>
+              <a:t>, the official Linux protocol stack</a:t>
+            </a:r>
+          </a:p>
+          <a:p>
+            <a:r>
+              <a:rPr lang="en-US" dirty="0" smtClean="0"/>
+              <a:t>“Plugins” implement features and profiles</a:t>
+            </a:r>
+          </a:p>
+          <a:p>
+            <a:pPr lvl="1"/>
+            <a:r>
+              <a:rPr lang="en-US" dirty="0" smtClean="0"/>
+              <a:t>Initializes application layer on startup</a:t>
+            </a:r>
+          </a:p>
+          <a:p>
+            <a:pPr lvl="1"/>
+            <a:r>
+              <a:rPr lang="en-US" dirty="0" smtClean="0"/>
+              <a:t>Runs scripts when adapter is registered and when a device is paired</a:t>
+            </a:r>
+          </a:p>
+          <a:p>
+            <a:pPr lvl="1"/>
+            <a:r>
+              <a:rPr lang="en-US" dirty="0" smtClean="0"/>
+              <a:t>There are to plugins support the pre-existing profiles</a:t>
+            </a:r>
+          </a:p>
+          <a:p>
+            <a:pPr lvl="2"/>
+            <a:r>
+              <a:rPr lang="en-US" dirty="0" smtClean="0"/>
+              <a:t>Custom plugins may also be used</a:t>
+            </a:r>
+          </a:p>
+          <a:p>
+            <a:r>
+              <a:rPr lang="en-US" dirty="0" smtClean="0"/>
+              <a:t>“Profiles” specify general communication behaviors</a:t>
+            </a:r>
+          </a:p>
+          <a:p>
+            <a:pPr lvl="1"/>
+            <a:r>
+              <a:rPr lang="en-US" dirty="0" smtClean="0"/>
+              <a:t>SHAF can adapt a pre-existing profile, or</a:t>
+            </a:r>
+          </a:p>
+          <a:p>
+            <a:pPr lvl="1"/>
+            <a:r>
+              <a:rPr lang="en-US" dirty="0" smtClean="0"/>
+              <a:t>Create a custom profile</a:t>
+            </a:r>
+          </a:p>
+          <a:p>
+            <a:endParaRPr lang="en-US" dirty="0" smtClean="0"/>
+          </a:p>
+          <a:p>
+            <a:pPr lvl="1"/>
+            <a:endParaRPr lang="en-US" dirty="0"/>
+          </a:p>
+        </p:txBody>
+      </p:sp>
+    </p:spTree>
+    <p:extLst>
+      <p:ext uri="{BB962C8B-B14F-4D97-AF65-F5344CB8AC3E}">
+        <p14:creationId xmlns:p14="http://schemas.microsoft.com/office/powerpoint/2010/main" val="351535355"/>
+      </p:ext>
+    </p:extLst>
+  </p:cSld>
+  <p:clrMapOvr>
+    <a:masterClrMapping/>
+  </p:clrMapOvr>
+</p:sld>
+</file>
+
+<file path=ppt/slides/slide6.xml><?xml version="1.0" encoding="utf-8"?>
+<p:sld xmlns:a="http://schemas.openxmlformats.org/drawingml/2006/main" xmlns:r="http://schemas.openxmlformats.org/officeDocument/2006/relationships" xmlns:p="http://schemas.openxmlformats.org/presentationml/2006/main">
+  <p:cSld>
+    <p:spTree>
+      <p:nvGrpSpPr>
+        <p:cNvPr id="1" name=""/>
+        <p:cNvGrpSpPr/>
+        <p:nvPr/>
+      </p:nvGrpSpPr>
+      <p:grpSpPr>
+        <a:xfrm>
+          <a:off x="0" y="0"/>
+          <a:ext cx="0" cy="0"/>
+          <a:chOff x="0" y="0"/>
+          <a:chExt cx="0" cy="0"/>
+        </a:xfrm>
+      </p:grpSpPr>
+      <p:sp>
+        <p:nvSpPr>
+          <p:cNvPr id="2" name="Title 1"/>
+          <p:cNvSpPr>
+            <a:spLocks noGrp="1"/>
+          </p:cNvSpPr>
+          <p:nvPr>
+            <p:ph type="title"/>
+          </p:nvPr>
+        </p:nvSpPr>
+        <p:spPr/>
+        <p:txBody>
+          <a:bodyPr/>
+          <a:lstStyle/>
+          <a:p>
+            <a:r>
+              <a:rPr lang="en-US" dirty="0" smtClean="0"/>
+              <a:t>Important First Tasks for Bluetooth</a:t>
+            </a:r>
+            <a:endParaRPr lang="en-US" dirty="0"/>
+          </a:p>
+        </p:txBody>
+      </p:sp>
+      <p:sp>
+        <p:nvSpPr>
+          <p:cNvPr id="3" name="Content Placeholder 2"/>
+          <p:cNvSpPr>
+            <a:spLocks noGrp="1"/>
+          </p:cNvSpPr>
+          <p:nvPr>
+            <p:ph idx="1"/>
+          </p:nvPr>
+        </p:nvSpPr>
+        <p:spPr>
+          <a:xfrm>
+            <a:off x="838200" y="2360345"/>
+            <a:ext cx="10515600" cy="2073339"/>
+          </a:xfrm>
+        </p:spPr>
+        <p:txBody>
+          <a:bodyPr/>
+          <a:lstStyle/>
+          <a:p>
+            <a:pPr>
+              <a:buFont typeface="Wingdings" charset="2"/>
+              <a:buChar char="q"/>
+            </a:pPr>
+            <a:r>
+              <a:rPr lang="en-US" dirty="0" smtClean="0"/>
+              <a:t>Pair an iPhone with an Edison</a:t>
+            </a:r>
+          </a:p>
+          <a:p>
+            <a:pPr>
+              <a:buFont typeface="Wingdings" charset="2"/>
+              <a:buChar char="q"/>
+            </a:pPr>
+            <a:r>
+              <a:rPr lang="en-US" dirty="0" smtClean="0"/>
+              <a:t>Decide if a pre-existing profile can be used</a:t>
+            </a:r>
+          </a:p>
+          <a:p>
+            <a:pPr lvl="1">
+              <a:buFont typeface="Courier New"/>
+              <a:buChar char="o"/>
+            </a:pPr>
+            <a:r>
+              <a:rPr lang="en-US" dirty="0" smtClean="0"/>
+              <a:t>Otherwise, decide functionality of custom profile</a:t>
+            </a:r>
+          </a:p>
+          <a:p>
+            <a:pPr>
+              <a:buFont typeface="Wingdings" charset="2"/>
+              <a:buChar char="q"/>
+            </a:pPr>
+            <a:r>
+              <a:rPr lang="en-US" dirty="0" smtClean="0"/>
+              <a:t>Communicate some data from Edison to Bluetooth via chosen profile</a:t>
+            </a:r>
+            <a:endParaRPr lang="en-US" dirty="0"/>
+          </a:p>
+        </p:txBody>
+      </p:sp>
+    </p:spTree>
+    <p:extLst>
+      <p:ext uri="{BB962C8B-B14F-4D97-AF65-F5344CB8AC3E}">
+        <p14:creationId xmlns:p14="http://schemas.microsoft.com/office/powerpoint/2010/main" val="3789901921"/>
+      </p:ext>
+    </p:extLst>
+  </p:cSld>
+  <p:clrMapOvr>
+    <a:masterClrMapping/>
+  </p:clrMapOvr>
+</p:sld>
+</file>
+
+<file path=ppt/slides/slide7.xml><?xml version="1.0" encoding="utf-8"?>
+<p:sld xmlns:a="http://schemas.openxmlformats.org/drawingml/2006/main" xmlns:r="http://schemas.openxmlformats.org/officeDocument/2006/relationships" xmlns:p="http://schemas.openxmlformats.org/presentationml/2006/main">
+  <p:cSld>
+    <p:spTree>
+      <p:nvGrpSpPr>
+        <p:cNvPr id="1" name=""/>
+        <p:cNvGrpSpPr/>
+        <p:nvPr/>
+      </p:nvGrpSpPr>
+      <p:grpSpPr>
+        <a:xfrm>
+          <a:off x="0" y="0"/>
+          <a:ext cx="0" cy="0"/>
+          <a:chOff x="0" y="0"/>
+          <a:chExt cx="0" cy="0"/>
+        </a:xfrm>
+      </p:grpSpPr>
+      <p:sp>
+        <p:nvSpPr>
+          <p:cNvPr id="2" name="Title 1"/>
+          <p:cNvSpPr>
+            <a:spLocks noGrp="1"/>
+          </p:cNvSpPr>
+          <p:nvPr>
+            <p:ph type="title"/>
+          </p:nvPr>
+        </p:nvSpPr>
+        <p:spPr/>
+        <p:txBody>
+          <a:bodyPr/>
+          <a:lstStyle/>
+          <a:p>
+            <a:r>
+              <a:rPr lang="en-US" dirty="0" smtClean="0"/>
               <a:t>Sources</a:t>
             </a:r>
             <a:endParaRPr lang="en-US" dirty="0"/>
@@ -3628,9 +3889,28 @@
           </a:p>
           <a:p>
             <a:r>
+              <a:rPr lang="en-US" i="1" dirty="0" smtClean="0"/>
+              <a:t>Intel Edison Bluetooth </a:t>
+            </a:r>
+            <a:r>
+              <a:rPr lang="en-US" i="1" dirty="0" smtClean="0"/>
+              <a:t>Guide</a:t>
+            </a:r>
+            <a:r>
               <a:rPr lang="en-US" dirty="0" smtClean="0"/>
-              <a:t>www.Apple.com</a:t>
-            </a:r>
+              <a:t>. </a:t>
+            </a:r>
+            <a:r>
+              <a:rPr lang="en-US" dirty="0" smtClean="0"/>
+              <a:t>June 2015, Revision 007</a:t>
+            </a:r>
+          </a:p>
+          <a:p>
+            <a:r>
+              <a:rPr lang="en-US" dirty="0" err="1" smtClean="0"/>
+              <a:t>www.apple.com</a:t>
+            </a:r>
+            <a:endParaRPr lang="en-US" dirty="0" smtClean="0"/>
           </a:p>
         </p:txBody>
       </p:sp>
@@ -3647,7 +3927,7 @@
   <p:timing>
     <p:tnLst>
       <p:par>
-        <p:cTn id="1" dur="indefinite" restart="never" nodeType="tmRoot"/>
+        <p:cTn xmlns:p14="http://schemas.microsoft.com/office/powerpoint/2010/main" id="1" dur="indefinite" restart="never" nodeType="tmRoot"/>
       </p:par>
     </p:tnLst>
   </p:timing>
@@ -3697,7 +3977,7 @@
     </a:clrScheme>
     <a:fontScheme name="Office">
       <a:majorFont>
-        <a:latin typeface="Calibri Light" panose="020F0302020204030204"/>
+        <a:latin typeface="Calibri Light"/>
         <a:ea typeface=""/>
         <a:cs typeface=""/>
         <a:font script="Jpan" typeface="游ゴシック Light"/>
@@ -3732,7 +4012,7 @@
         <a:font script="Geor" typeface="Sylfaen"/>
       </a:majorFont>
       <a:minorFont>
-        <a:latin typeface="Calibri" panose="020F0502020204030204"/>
+        <a:latin typeface="Calibri"/>
         <a:ea typeface=""/>
         <a:cs typeface=""/>
         <a:font script="Jpan" typeface="游ゴシック"/>
@@ -3909,7 +4189,7 @@
   <a:extraClrSchemeLst/>
   <a:extLst>
     <a:ext uri="{05A4C25C-085E-4340-85A3-A5531E510DB2}">
-      <thm15:themeFamily xmlns:thm15="http://schemas.microsoft.com/office/thememl/2012/main" name="Office Theme" id="{62F939B6-93AF-4DB8-9C6B-D6C7DFDC589F}" vid="{4A3C46E8-61CC-4603-A589-7422A47A8E4A}"/>
+      <thm15:themeFamily xmlns="" xmlns:thm15="http://schemas.microsoft.com/office/thememl/2012/main" name="Office Theme" id="{62F939B6-93AF-4DB8-9C6B-D6C7DFDC589F}" vid="{4A3C46E8-61CC-4603-A589-7422A47A8E4A}"/>
     </a:ext>
   </a:extLst>
 </a:theme>

</xml_diff>